<commit_message>
Agregado de fechas en el alto nivel
* correccion de descripciones en la seccion avances del tablero v1.2

* Coreccion de descripciones en las seccion de decisiones del tablero v1.2
</commit_message>
<xml_diff>
--- a/trunk/docs/Entregables/Gantt/Gantt Alto Nivel v1.4.pptx
+++ b/trunk/docs/Entregables/Gantt/Gantt Alto Nivel v1.4.pptx
@@ -192,7 +192,7 @@
           <a:p>
             <a:fld id="{AC8B1F79-03DF-461E-8088-E5DB7EFE7A9B}" type="datetimeFigureOut">
               <a:rPr lang="en-US" smtClean="0"/>
-              <a:t>6/26/2016</a:t>
+              <a:t>6/29/2016</a:t>
             </a:fld>
             <a:endParaRPr lang="en-US"/>
           </a:p>
@@ -725,7 +725,7 @@
           <a:p>
             <a:fld id="{8FA1617A-90DC-4CC3-A532-0A26A8F3A218}" type="datetimeFigureOut">
               <a:rPr lang="en-US" smtClean="0"/>
-              <a:t>6/26/2016</a:t>
+              <a:t>6/29/2016</a:t>
             </a:fld>
             <a:endParaRPr lang="en-US"/>
           </a:p>
@@ -895,7 +895,7 @@
           <a:p>
             <a:fld id="{8FA1617A-90DC-4CC3-A532-0A26A8F3A218}" type="datetimeFigureOut">
               <a:rPr lang="en-US" smtClean="0"/>
-              <a:t>6/26/2016</a:t>
+              <a:t>6/29/2016</a:t>
             </a:fld>
             <a:endParaRPr lang="en-US"/>
           </a:p>
@@ -1075,7 +1075,7 @@
           <a:p>
             <a:fld id="{8FA1617A-90DC-4CC3-A532-0A26A8F3A218}" type="datetimeFigureOut">
               <a:rPr lang="en-US" smtClean="0"/>
-              <a:t>6/26/2016</a:t>
+              <a:t>6/29/2016</a:t>
             </a:fld>
             <a:endParaRPr lang="en-US"/>
           </a:p>
@@ -1245,7 +1245,7 @@
           <a:p>
             <a:fld id="{8FA1617A-90DC-4CC3-A532-0A26A8F3A218}" type="datetimeFigureOut">
               <a:rPr lang="en-US" smtClean="0"/>
-              <a:t>6/26/2016</a:t>
+              <a:t>6/29/2016</a:t>
             </a:fld>
             <a:endParaRPr lang="en-US"/>
           </a:p>
@@ -1491,7 +1491,7 @@
           <a:p>
             <a:fld id="{8FA1617A-90DC-4CC3-A532-0A26A8F3A218}" type="datetimeFigureOut">
               <a:rPr lang="en-US" smtClean="0"/>
-              <a:t>6/26/2016</a:t>
+              <a:t>6/29/2016</a:t>
             </a:fld>
             <a:endParaRPr lang="en-US"/>
           </a:p>
@@ -1779,7 +1779,7 @@
           <a:p>
             <a:fld id="{8FA1617A-90DC-4CC3-A532-0A26A8F3A218}" type="datetimeFigureOut">
               <a:rPr lang="en-US" smtClean="0"/>
-              <a:t>6/26/2016</a:t>
+              <a:t>6/29/2016</a:t>
             </a:fld>
             <a:endParaRPr lang="en-US"/>
           </a:p>
@@ -2201,7 +2201,7 @@
           <a:p>
             <a:fld id="{8FA1617A-90DC-4CC3-A532-0A26A8F3A218}" type="datetimeFigureOut">
               <a:rPr lang="en-US" smtClean="0"/>
-              <a:t>6/26/2016</a:t>
+              <a:t>6/29/2016</a:t>
             </a:fld>
             <a:endParaRPr lang="en-US"/>
           </a:p>
@@ -2319,7 +2319,7 @@
           <a:p>
             <a:fld id="{8FA1617A-90DC-4CC3-A532-0A26A8F3A218}" type="datetimeFigureOut">
               <a:rPr lang="en-US" smtClean="0"/>
-              <a:t>6/26/2016</a:t>
+              <a:t>6/29/2016</a:t>
             </a:fld>
             <a:endParaRPr lang="en-US"/>
           </a:p>
@@ -2414,7 +2414,7 @@
           <a:p>
             <a:fld id="{8FA1617A-90DC-4CC3-A532-0A26A8F3A218}" type="datetimeFigureOut">
               <a:rPr lang="en-US" smtClean="0"/>
-              <a:t>6/26/2016</a:t>
+              <a:t>6/29/2016</a:t>
             </a:fld>
             <a:endParaRPr lang="en-US"/>
           </a:p>
@@ -2691,7 +2691,7 @@
           <a:p>
             <a:fld id="{8FA1617A-90DC-4CC3-A532-0A26A8F3A218}" type="datetimeFigureOut">
               <a:rPr lang="en-US" smtClean="0"/>
-              <a:t>6/26/2016</a:t>
+              <a:t>6/29/2016</a:t>
             </a:fld>
             <a:endParaRPr lang="en-US"/>
           </a:p>
@@ -2944,7 +2944,7 @@
           <a:p>
             <a:fld id="{8FA1617A-90DC-4CC3-A532-0A26A8F3A218}" type="datetimeFigureOut">
               <a:rPr lang="en-US" smtClean="0"/>
-              <a:t>6/26/2016</a:t>
+              <a:t>6/29/2016</a:t>
             </a:fld>
             <a:endParaRPr lang="en-US"/>
           </a:p>
@@ -3157,7 +3157,7 @@
           <a:p>
             <a:fld id="{8FA1617A-90DC-4CC3-A532-0A26A8F3A218}" type="datetimeFigureOut">
               <a:rPr lang="en-US" smtClean="0"/>
-              <a:t>6/26/2016</a:t>
+              <a:t>6/29/2016</a:t>
             </a:fld>
             <a:endParaRPr lang="en-US"/>
           </a:p>
@@ -4134,7 +4134,7 @@
         </p:nvSpPr>
         <p:spPr>
           <a:xfrm>
-            <a:off x="0" y="1029882"/>
+            <a:off x="0" y="1937183"/>
             <a:ext cx="13778831" cy="652873"/>
           </a:xfrm>
           <a:prstGeom prst="homePlate">
@@ -4198,8 +4198,8 @@
         </p:nvSpPr>
         <p:spPr>
           <a:xfrm>
-            <a:off x="-1" y="1874573"/>
-            <a:ext cx="5046061" cy="652873"/>
+            <a:off x="-1" y="2796682"/>
+            <a:ext cx="5046061" cy="441446"/>
           </a:xfrm>
           <a:prstGeom prst="homePlate">
             <a:avLst/>
@@ -4246,8 +4246,8 @@
         </p:nvSpPr>
         <p:spPr>
           <a:xfrm>
-            <a:off x="2719190" y="2682177"/>
-            <a:ext cx="2326869" cy="652873"/>
+            <a:off x="2719190" y="3682066"/>
+            <a:ext cx="2326869" cy="456962"/>
           </a:xfrm>
           <a:prstGeom prst="homePlate">
             <a:avLst/>
@@ -4290,8 +4290,8 @@
         </p:nvSpPr>
         <p:spPr>
           <a:xfrm>
-            <a:off x="5142284" y="3707463"/>
-            <a:ext cx="7177479" cy="652873"/>
+            <a:off x="5142284" y="4211036"/>
+            <a:ext cx="7177480" cy="474136"/>
           </a:xfrm>
           <a:prstGeom prst="homePlate">
             <a:avLst/>
@@ -4350,8 +4350,8 @@
         </p:nvSpPr>
         <p:spPr>
           <a:xfrm>
-            <a:off x="12542084" y="6301304"/>
-            <a:ext cx="444641" cy="652873"/>
+            <a:off x="12542084" y="6615667"/>
+            <a:ext cx="444641" cy="403681"/>
           </a:xfrm>
           <a:prstGeom prst="homePlate">
             <a:avLst/>
@@ -4390,8 +4390,8 @@
         </p:nvSpPr>
         <p:spPr>
           <a:xfrm>
-            <a:off x="12542084" y="7073207"/>
-            <a:ext cx="1236747" cy="652873"/>
+            <a:off x="12542084" y="7171707"/>
+            <a:ext cx="1236747" cy="495713"/>
           </a:xfrm>
           <a:prstGeom prst="homePlate">
             <a:avLst/>
@@ -4438,8 +4438,8 @@
         </p:nvSpPr>
         <p:spPr>
           <a:xfrm>
-            <a:off x="5142284" y="4639883"/>
-            <a:ext cx="3354760" cy="652873"/>
+            <a:off x="5142284" y="5147140"/>
+            <a:ext cx="3354760" cy="470452"/>
           </a:xfrm>
           <a:prstGeom prst="homePlate">
             <a:avLst/>
@@ -4484,8 +4484,8 @@
         </p:nvSpPr>
         <p:spPr>
           <a:xfrm>
-            <a:off x="8497044" y="5441248"/>
-            <a:ext cx="3822720" cy="652873"/>
+            <a:off x="8497044" y="5783746"/>
+            <a:ext cx="3822720" cy="479729"/>
           </a:xfrm>
           <a:prstGeom prst="homePlate">
             <a:avLst/>
@@ -4537,7 +4537,7 @@
         </p:nvSpPr>
         <p:spPr>
           <a:xfrm>
-            <a:off x="13421493" y="6954177"/>
+            <a:off x="13537604" y="6947340"/>
             <a:ext cx="714675" cy="755284"/>
           </a:xfrm>
           <a:prstGeom prst="star5">
@@ -4575,8 +4575,8 @@
         </p:nvSpPr>
         <p:spPr>
           <a:xfrm>
-            <a:off x="6781362" y="2682177"/>
-            <a:ext cx="1715681" cy="652873"/>
+            <a:off x="6787087" y="3085718"/>
+            <a:ext cx="1715681" cy="441446"/>
           </a:xfrm>
           <a:prstGeom prst="homePlate">
             <a:avLst/>
@@ -4604,18 +4604,18 @@
           <a:p>
             <a:pPr algn="ctr"/>
             <a:r>
-              <a:rPr lang="en-US" sz="1600" b="1" dirty="0" err="1" smtClean="0"/>
+              <a:rPr lang="en-US" sz="1400" b="1" dirty="0" err="1" smtClean="0"/>
               <a:t>Presentacion</a:t>
             </a:r>
             <a:r>
-              <a:rPr lang="en-US" sz="1600" b="1" dirty="0" smtClean="0"/>
+              <a:rPr lang="en-US" sz="1400" b="1" dirty="0" smtClean="0"/>
               <a:t> </a:t>
             </a:r>
             <a:r>
-              <a:rPr lang="en-US" sz="1600" b="1" dirty="0" err="1" smtClean="0"/>
+              <a:rPr lang="en-US" sz="1400" b="1" dirty="0" err="1" smtClean="0"/>
               <a:t>Comercial</a:t>
             </a:r>
-            <a:endParaRPr lang="en-US" sz="1600" b="1" dirty="0"/>
+            <a:endParaRPr lang="en-US" sz="1400" b="1" dirty="0"/>
           </a:p>
         </p:txBody>
       </p:sp>
@@ -4623,17 +4623,16 @@
         <p:nvCxnSpPr>
           <p:cNvPr id="25" name="Elbow Connector 24"/>
           <p:cNvCxnSpPr>
-            <a:stCxn id="27" idx="3"/>
             <a:endCxn id="29" idx="1"/>
           </p:cNvCxnSpPr>
           <p:nvPr/>
         </p:nvCxnSpPr>
         <p:spPr>
-          <a:xfrm>
-            <a:off x="5046060" y="2201010"/>
-            <a:ext cx="96224" cy="1832890"/>
-          </a:xfrm>
-          <a:prstGeom prst="bentConnector3">
+          <a:xfrm rot="16200000" flipH="1">
+            <a:off x="4541240" y="3847060"/>
+            <a:ext cx="1105864" cy="96223"/>
+          </a:xfrm>
+          <a:prstGeom prst="bentConnector2">
             <a:avLst/>
           </a:prstGeom>
           <a:ln w="38100">
@@ -4670,12 +4669,12 @@
         </p:nvCxnSpPr>
         <p:spPr>
           <a:xfrm>
-            <a:off x="12319763" y="4033900"/>
-            <a:ext cx="222321" cy="2593841"/>
+            <a:off x="12319764" y="4448104"/>
+            <a:ext cx="222320" cy="2369404"/>
           </a:xfrm>
           <a:prstGeom prst="bentConnector3">
             <a:avLst>
-              <a:gd name="adj1" fmla="val 15725"/>
+              <a:gd name="adj1" fmla="val 50000"/>
             </a:avLst>
           </a:prstGeom>
           <a:ln w="38100">
@@ -4712,12 +4711,12 @@
         </p:nvCxnSpPr>
         <p:spPr>
           <a:xfrm>
-            <a:off x="12319763" y="4033900"/>
-            <a:ext cx="222321" cy="3365744"/>
+            <a:off x="12319764" y="4448104"/>
+            <a:ext cx="222320" cy="2971460"/>
           </a:xfrm>
           <a:prstGeom prst="bentConnector3">
             <a:avLst>
-              <a:gd name="adj1" fmla="val 15725"/>
+              <a:gd name="adj1" fmla="val 50000"/>
             </a:avLst>
           </a:prstGeom>
           <a:ln w="38100">
@@ -4751,7 +4750,7 @@
         </p:nvSpPr>
         <p:spPr>
           <a:xfrm>
-            <a:off x="12430923" y="5993527"/>
+            <a:off x="12430923" y="6318363"/>
             <a:ext cx="1637396" cy="307777"/>
           </a:xfrm>
           <a:prstGeom prst="rect">
@@ -4785,7 +4784,7 @@
         </p:nvSpPr>
         <p:spPr>
           <a:xfrm>
-            <a:off x="13507580" y="7230367"/>
+            <a:off x="13623691" y="7223530"/>
             <a:ext cx="720180" cy="338554"/>
           </a:xfrm>
           <a:prstGeom prst="rect">
@@ -4804,6 +4803,333 @@
               <a:t>18/11</a:t>
             </a:r>
             <a:endParaRPr lang="en-US" sz="1600" b="1" dirty="0"/>
+          </a:p>
+        </p:txBody>
+      </p:sp>
+      <p:cxnSp>
+        <p:nvCxnSpPr>
+          <p:cNvPr id="3" name="Straight Connector 2"/>
+          <p:cNvCxnSpPr/>
+          <p:nvPr/>
+        </p:nvCxnSpPr>
+        <p:spPr>
+          <a:xfrm>
+            <a:off x="4536604" y="2590056"/>
+            <a:ext cx="0" cy="5182344"/>
+          </a:xfrm>
+          <a:prstGeom prst="line">
+            <a:avLst/>
+          </a:prstGeom>
+          <a:ln w="57150">
+            <a:solidFill>
+              <a:schemeClr val="tx1"/>
+            </a:solidFill>
+            <a:prstDash val="sysDot"/>
+          </a:ln>
+        </p:spPr>
+        <p:style>
+          <a:lnRef idx="1">
+            <a:schemeClr val="accent1"/>
+          </a:lnRef>
+          <a:fillRef idx="0">
+            <a:schemeClr val="accent1"/>
+          </a:fillRef>
+          <a:effectRef idx="0">
+            <a:schemeClr val="accent1"/>
+          </a:effectRef>
+          <a:fontRef idx="minor">
+            <a:schemeClr val="tx1"/>
+          </a:fontRef>
+        </p:style>
+      </p:cxnSp>
+      <p:sp>
+        <p:nvSpPr>
+          <p:cNvPr id="41" name="Diamond 40"/>
+          <p:cNvSpPr/>
+          <p:nvPr/>
+        </p:nvSpPr>
+        <p:spPr>
+          <a:xfrm>
+            <a:off x="4866041" y="966447"/>
+            <a:ext cx="360040" cy="441446"/>
+          </a:xfrm>
+          <a:prstGeom prst="diamond">
+            <a:avLst/>
+          </a:prstGeom>
+        </p:spPr>
+        <p:style>
+          <a:lnRef idx="2">
+            <a:schemeClr val="accent1">
+              <a:shade val="50000"/>
+            </a:schemeClr>
+          </a:lnRef>
+          <a:fillRef idx="1">
+            <a:schemeClr val="accent1"/>
+          </a:fillRef>
+          <a:effectRef idx="0">
+            <a:schemeClr val="accent1"/>
+          </a:effectRef>
+          <a:fontRef idx="minor">
+            <a:schemeClr val="lt1"/>
+          </a:fontRef>
+        </p:style>
+        <p:txBody>
+          <a:bodyPr rtlCol="0" anchor="ctr"/>
+          <a:lstStyle/>
+          <a:p>
+            <a:pPr algn="ctr"/>
+            <a:endParaRPr lang="en-US"/>
+          </a:p>
+        </p:txBody>
+      </p:sp>
+      <p:sp>
+        <p:nvSpPr>
+          <p:cNvPr id="42" name="TextBox 41"/>
+          <p:cNvSpPr txBox="1"/>
+          <p:nvPr/>
+        </p:nvSpPr>
+        <p:spPr>
+          <a:xfrm>
+            <a:off x="4203521" y="1425898"/>
+            <a:ext cx="1685075" cy="430887"/>
+          </a:xfrm>
+          <a:prstGeom prst="rect">
+            <a:avLst/>
+          </a:prstGeom>
+          <a:noFill/>
+        </p:spPr>
+        <p:txBody>
+          <a:bodyPr wrap="square" rtlCol="0">
+            <a:spAutoFit/>
+          </a:bodyPr>
+          <a:lstStyle/>
+          <a:p>
+            <a:pPr algn="ctr"/>
+            <a:r>
+              <a:rPr lang="en-US" sz="1100" dirty="0" smtClean="0"/>
+              <a:t>01/07 – Fin de  </a:t>
+            </a:r>
+            <a:r>
+              <a:rPr lang="en-US" sz="1100" dirty="0" err="1" smtClean="0"/>
+              <a:t>etapa</a:t>
+            </a:r>
+            <a:r>
+              <a:rPr lang="en-US" sz="1100" dirty="0" smtClean="0"/>
+              <a:t> de </a:t>
+            </a:r>
+            <a:r>
+              <a:rPr lang="en-US" sz="1100" dirty="0" err="1" smtClean="0"/>
+              <a:t>Inicio</a:t>
+            </a:r>
+            <a:r>
+              <a:rPr lang="en-US" sz="1100" dirty="0" smtClean="0"/>
+              <a:t> y </a:t>
+            </a:r>
+            <a:r>
+              <a:rPr lang="en-US" sz="1100" dirty="0" err="1" smtClean="0"/>
+              <a:t>Relevamiento</a:t>
+            </a:r>
+            <a:endParaRPr lang="en-US" sz="1100" dirty="0"/>
+          </a:p>
+        </p:txBody>
+      </p:sp>
+      <p:sp>
+        <p:nvSpPr>
+          <p:cNvPr id="47" name="Diamond 46"/>
+          <p:cNvSpPr/>
+          <p:nvPr/>
+        </p:nvSpPr>
+        <p:spPr>
+          <a:xfrm>
+            <a:off x="8317024" y="966447"/>
+            <a:ext cx="360040" cy="441446"/>
+          </a:xfrm>
+          <a:prstGeom prst="diamond">
+            <a:avLst/>
+          </a:prstGeom>
+        </p:spPr>
+        <p:style>
+          <a:lnRef idx="2">
+            <a:schemeClr val="accent1">
+              <a:shade val="50000"/>
+            </a:schemeClr>
+          </a:lnRef>
+          <a:fillRef idx="1">
+            <a:schemeClr val="accent1"/>
+          </a:fillRef>
+          <a:effectRef idx="0">
+            <a:schemeClr val="accent1"/>
+          </a:effectRef>
+          <a:fontRef idx="minor">
+            <a:schemeClr val="lt1"/>
+          </a:fontRef>
+        </p:style>
+        <p:txBody>
+          <a:bodyPr rtlCol="0" anchor="ctr"/>
+          <a:lstStyle/>
+          <a:p>
+            <a:pPr algn="ctr"/>
+            <a:endParaRPr lang="en-US"/>
+          </a:p>
+        </p:txBody>
+      </p:sp>
+      <p:sp>
+        <p:nvSpPr>
+          <p:cNvPr id="49" name="TextBox 48"/>
+          <p:cNvSpPr txBox="1"/>
+          <p:nvPr/>
+        </p:nvSpPr>
+        <p:spPr>
+          <a:xfrm>
+            <a:off x="7676065" y="1439089"/>
+            <a:ext cx="1685075" cy="430887"/>
+          </a:xfrm>
+          <a:prstGeom prst="rect">
+            <a:avLst/>
+          </a:prstGeom>
+          <a:noFill/>
+        </p:spPr>
+        <p:txBody>
+          <a:bodyPr wrap="square" rtlCol="0">
+            <a:spAutoFit/>
+          </a:bodyPr>
+          <a:lstStyle/>
+          <a:p>
+            <a:pPr algn="ctr"/>
+            <a:r>
+              <a:rPr lang="en-US" sz="1100" dirty="0" smtClean="0"/>
+              <a:t>30/08 – Fin de  </a:t>
+            </a:r>
+            <a:r>
+              <a:rPr lang="en-US" sz="1100" dirty="0" err="1" smtClean="0"/>
+              <a:t>Incremento</a:t>
+            </a:r>
+            <a:r>
+              <a:rPr lang="en-US" sz="1100" dirty="0" smtClean="0"/>
+              <a:t> 1</a:t>
+            </a:r>
+            <a:endParaRPr lang="en-US" sz="1100" dirty="0"/>
+          </a:p>
+        </p:txBody>
+      </p:sp>
+      <p:sp>
+        <p:nvSpPr>
+          <p:cNvPr id="51" name="Diamond 50"/>
+          <p:cNvSpPr/>
+          <p:nvPr/>
+        </p:nvSpPr>
+        <p:spPr>
+          <a:xfrm>
+            <a:off x="12250903" y="966447"/>
+            <a:ext cx="360040" cy="441446"/>
+          </a:xfrm>
+          <a:prstGeom prst="diamond">
+            <a:avLst/>
+          </a:prstGeom>
+        </p:spPr>
+        <p:style>
+          <a:lnRef idx="2">
+            <a:schemeClr val="accent1">
+              <a:shade val="50000"/>
+            </a:schemeClr>
+          </a:lnRef>
+          <a:fillRef idx="1">
+            <a:schemeClr val="accent1"/>
+          </a:fillRef>
+          <a:effectRef idx="0">
+            <a:schemeClr val="accent1"/>
+          </a:effectRef>
+          <a:fontRef idx="minor">
+            <a:schemeClr val="lt1"/>
+          </a:fontRef>
+        </p:style>
+        <p:txBody>
+          <a:bodyPr rtlCol="0" anchor="ctr"/>
+          <a:lstStyle/>
+          <a:p>
+            <a:pPr algn="ctr"/>
+            <a:endParaRPr lang="en-US"/>
+          </a:p>
+        </p:txBody>
+      </p:sp>
+      <p:cxnSp>
+        <p:nvCxnSpPr>
+          <p:cNvPr id="44" name="Straight Connector 43"/>
+          <p:cNvCxnSpPr>
+            <a:stCxn id="51" idx="2"/>
+          </p:cNvCxnSpPr>
+          <p:nvPr/>
+        </p:nvCxnSpPr>
+        <p:spPr>
+          <a:xfrm>
+            <a:off x="12430923" y="1407893"/>
+            <a:ext cx="0" cy="3974473"/>
+          </a:xfrm>
+          <a:prstGeom prst="line">
+            <a:avLst/>
+          </a:prstGeom>
+          <a:ln>
+            <a:prstDash val="sysDash"/>
+          </a:ln>
+        </p:spPr>
+        <p:style>
+          <a:lnRef idx="1">
+            <a:schemeClr val="accent1"/>
+          </a:lnRef>
+          <a:fillRef idx="0">
+            <a:schemeClr val="accent1"/>
+          </a:fillRef>
+          <a:effectRef idx="0">
+            <a:schemeClr val="accent1"/>
+          </a:effectRef>
+          <a:fontRef idx="minor">
+            <a:schemeClr val="tx1"/>
+          </a:fontRef>
+        </p:style>
+      </p:cxnSp>
+      <p:sp>
+        <p:nvSpPr>
+          <p:cNvPr id="52" name="TextBox 51"/>
+          <p:cNvSpPr txBox="1"/>
+          <p:nvPr/>
+        </p:nvSpPr>
+        <p:spPr>
+          <a:xfrm>
+            <a:off x="11628486" y="1401947"/>
+            <a:ext cx="1685075" cy="430887"/>
+          </a:xfrm>
+          <a:prstGeom prst="rect">
+            <a:avLst/>
+          </a:prstGeom>
+          <a:noFill/>
+        </p:spPr>
+        <p:txBody>
+          <a:bodyPr wrap="square" rtlCol="0">
+            <a:spAutoFit/>
+          </a:bodyPr>
+          <a:lstStyle/>
+          <a:p>
+            <a:pPr algn="ctr"/>
+            <a:r>
+              <a:rPr lang="en-US" sz="1100" dirty="0" smtClean="0"/>
+              <a:t>8/11 </a:t>
+            </a:r>
+          </a:p>
+          <a:p>
+            <a:pPr algn="ctr"/>
+            <a:r>
+              <a:rPr lang="en-US" sz="1100" dirty="0" smtClean="0"/>
+              <a:t>Fin de  </a:t>
+            </a:r>
+            <a:r>
+              <a:rPr lang="en-US" sz="1100" dirty="0" err="1" smtClean="0"/>
+              <a:t>Incremento</a:t>
+            </a:r>
+            <a:r>
+              <a:rPr lang="en-US" sz="1100" dirty="0" smtClean="0"/>
+              <a:t> 2</a:t>
+            </a:r>
+            <a:endParaRPr lang="en-US" sz="1100" dirty="0"/>
           </a:p>
         </p:txBody>
       </p:sp>

</xml_diff>

<commit_message>
Agregado de tablero de control
</commit_message>
<xml_diff>
--- a/trunk/docs/Entregables/Gantt/Gantt Alto Nivel v1.4.pptx
+++ b/trunk/docs/Entregables/Gantt/Gantt Alto Nivel v1.4.pptx
@@ -107,6 +107,22 @@
       </a:defRPr>
     </a:lvl9pPr>
   </p:defaultTextStyle>
+  <p:extLst>
+    <p:ext uri="{EFAFB233-063F-42B5-8137-9DF3F51BA10A}">
+      <p15:sldGuideLst xmlns:p15="http://schemas.microsoft.com/office/powerpoint/2012/main">
+        <p15:guide id="1" orient="horz" pos="2448">
+          <p15:clr>
+            <a:srgbClr val="A4A3A4"/>
+          </p15:clr>
+        </p15:guide>
+        <p15:guide id="2" pos="4536">
+          <p15:clr>
+            <a:srgbClr val="A4A3A4"/>
+          </p15:clr>
+        </p15:guide>
+      </p15:sldGuideLst>
+    </p:ext>
+  </p:extLst>
 </p:presentation>
 </file>
 
@@ -192,7 +208,7 @@
           <a:p>
             <a:fld id="{AC8B1F79-03DF-461E-8088-E5DB7EFE7A9B}" type="datetimeFigureOut">
               <a:rPr lang="en-US" smtClean="0"/>
-              <a:t>6/29/2016</a:t>
+              <a:t>9/20/2016</a:t>
             </a:fld>
             <a:endParaRPr lang="en-US"/>
           </a:p>
@@ -256,38 +272,37 @@
           <a:p>
             <a:pPr lvl="0"/>
             <a:r>
-              <a:rPr lang="en-US" smtClean="0"/>
+              <a:rPr lang="en-US"/>
               <a:t>Click to edit Master text styles</a:t>
             </a:r>
           </a:p>
           <a:p>
             <a:pPr lvl="1"/>
             <a:r>
-              <a:rPr lang="en-US" smtClean="0"/>
+              <a:rPr lang="en-US"/>
               <a:t>Second level</a:t>
             </a:r>
           </a:p>
           <a:p>
             <a:pPr lvl="2"/>
             <a:r>
-              <a:rPr lang="en-US" smtClean="0"/>
+              <a:rPr lang="en-US"/>
               <a:t>Third level</a:t>
             </a:r>
           </a:p>
           <a:p>
             <a:pPr lvl="3"/>
             <a:r>
-              <a:rPr lang="en-US" smtClean="0"/>
+              <a:rPr lang="en-US"/>
               <a:t>Fourth level</a:t>
             </a:r>
           </a:p>
           <a:p>
             <a:pPr lvl="4"/>
             <a:r>
-              <a:rPr lang="en-US" smtClean="0"/>
+              <a:rPr lang="en-US"/>
               <a:t>Fifth level</a:t>
             </a:r>
-            <a:endParaRPr lang="en-US"/>
           </a:p>
         </p:txBody>
       </p:sp>
@@ -582,10 +597,9 @@
           <a:lstStyle/>
           <a:p>
             <a:r>
-              <a:rPr lang="en-US" smtClean="0"/>
+              <a:rPr lang="en-US"/>
               <a:t>Click to edit Master title style</a:t>
             </a:r>
-            <a:endParaRPr lang="en-US"/>
           </a:p>
         </p:txBody>
       </p:sp>
@@ -701,10 +715,9 @@
           </a:lstStyle>
           <a:p>
             <a:r>
-              <a:rPr lang="en-US" smtClean="0"/>
+              <a:rPr lang="en-US"/>
               <a:t>Click to edit Master subtitle style</a:t>
             </a:r>
-            <a:endParaRPr lang="en-US"/>
           </a:p>
         </p:txBody>
       </p:sp>
@@ -725,7 +738,7 @@
           <a:p>
             <a:fld id="{8FA1617A-90DC-4CC3-A532-0A26A8F3A218}" type="datetimeFigureOut">
               <a:rPr lang="en-US" smtClean="0"/>
-              <a:t>6/29/2016</a:t>
+              <a:t>9/20/2016</a:t>
             </a:fld>
             <a:endParaRPr lang="en-US"/>
           </a:p>
@@ -819,10 +832,9 @@
           <a:lstStyle/>
           <a:p>
             <a:r>
-              <a:rPr lang="en-US" smtClean="0"/>
+              <a:rPr lang="en-US"/>
               <a:t>Click to edit Master title style</a:t>
             </a:r>
-            <a:endParaRPr lang="en-US"/>
           </a:p>
         </p:txBody>
       </p:sp>
@@ -843,38 +855,37 @@
           <a:p>
             <a:pPr lvl="0"/>
             <a:r>
-              <a:rPr lang="en-US" smtClean="0"/>
+              <a:rPr lang="en-US"/>
               <a:t>Click to edit Master text styles</a:t>
             </a:r>
           </a:p>
           <a:p>
             <a:pPr lvl="1"/>
             <a:r>
-              <a:rPr lang="en-US" smtClean="0"/>
+              <a:rPr lang="en-US"/>
               <a:t>Second level</a:t>
             </a:r>
           </a:p>
           <a:p>
             <a:pPr lvl="2"/>
             <a:r>
-              <a:rPr lang="en-US" smtClean="0"/>
+              <a:rPr lang="en-US"/>
               <a:t>Third level</a:t>
             </a:r>
           </a:p>
           <a:p>
             <a:pPr lvl="3"/>
             <a:r>
-              <a:rPr lang="en-US" smtClean="0"/>
+              <a:rPr lang="en-US"/>
               <a:t>Fourth level</a:t>
             </a:r>
           </a:p>
           <a:p>
             <a:pPr lvl="4"/>
             <a:r>
-              <a:rPr lang="en-US" smtClean="0"/>
+              <a:rPr lang="en-US"/>
               <a:t>Fifth level</a:t>
             </a:r>
-            <a:endParaRPr lang="en-US"/>
           </a:p>
         </p:txBody>
       </p:sp>
@@ -895,7 +906,7 @@
           <a:p>
             <a:fld id="{8FA1617A-90DC-4CC3-A532-0A26A8F3A218}" type="datetimeFigureOut">
               <a:rPr lang="en-US" smtClean="0"/>
-              <a:t>6/29/2016</a:t>
+              <a:t>9/20/2016</a:t>
             </a:fld>
             <a:endParaRPr lang="en-US"/>
           </a:p>
@@ -994,10 +1005,9 @@
           <a:lstStyle/>
           <a:p>
             <a:r>
-              <a:rPr lang="en-US" smtClean="0"/>
+              <a:rPr lang="en-US"/>
               <a:t>Click to edit Master title style</a:t>
             </a:r>
-            <a:endParaRPr lang="en-US"/>
           </a:p>
         </p:txBody>
       </p:sp>
@@ -1023,38 +1033,37 @@
           <a:p>
             <a:pPr lvl="0"/>
             <a:r>
-              <a:rPr lang="en-US" smtClean="0"/>
+              <a:rPr lang="en-US"/>
               <a:t>Click to edit Master text styles</a:t>
             </a:r>
           </a:p>
           <a:p>
             <a:pPr lvl="1"/>
             <a:r>
-              <a:rPr lang="en-US" smtClean="0"/>
+              <a:rPr lang="en-US"/>
               <a:t>Second level</a:t>
             </a:r>
           </a:p>
           <a:p>
             <a:pPr lvl="2"/>
             <a:r>
-              <a:rPr lang="en-US" smtClean="0"/>
+              <a:rPr lang="en-US"/>
               <a:t>Third level</a:t>
             </a:r>
           </a:p>
           <a:p>
             <a:pPr lvl="3"/>
             <a:r>
-              <a:rPr lang="en-US" smtClean="0"/>
+              <a:rPr lang="en-US"/>
               <a:t>Fourth level</a:t>
             </a:r>
           </a:p>
           <a:p>
             <a:pPr lvl="4"/>
             <a:r>
-              <a:rPr lang="en-US" smtClean="0"/>
+              <a:rPr lang="en-US"/>
               <a:t>Fifth level</a:t>
             </a:r>
-            <a:endParaRPr lang="en-US"/>
           </a:p>
         </p:txBody>
       </p:sp>
@@ -1075,7 +1084,7 @@
           <a:p>
             <a:fld id="{8FA1617A-90DC-4CC3-A532-0A26A8F3A218}" type="datetimeFigureOut">
               <a:rPr lang="en-US" smtClean="0"/>
-              <a:t>6/29/2016</a:t>
+              <a:t>9/20/2016</a:t>
             </a:fld>
             <a:endParaRPr lang="en-US"/>
           </a:p>
@@ -1169,10 +1178,9 @@
           <a:lstStyle/>
           <a:p>
             <a:r>
-              <a:rPr lang="en-US" smtClean="0"/>
+              <a:rPr lang="en-US"/>
               <a:t>Click to edit Master title style</a:t>
             </a:r>
-            <a:endParaRPr lang="en-US"/>
           </a:p>
         </p:txBody>
       </p:sp>
@@ -1193,38 +1201,37 @@
           <a:p>
             <a:pPr lvl="0"/>
             <a:r>
-              <a:rPr lang="en-US" smtClean="0"/>
+              <a:rPr lang="en-US"/>
               <a:t>Click to edit Master text styles</a:t>
             </a:r>
           </a:p>
           <a:p>
             <a:pPr lvl="1"/>
             <a:r>
-              <a:rPr lang="en-US" smtClean="0"/>
+              <a:rPr lang="en-US"/>
               <a:t>Second level</a:t>
             </a:r>
           </a:p>
           <a:p>
             <a:pPr lvl="2"/>
             <a:r>
-              <a:rPr lang="en-US" smtClean="0"/>
+              <a:rPr lang="en-US"/>
               <a:t>Third level</a:t>
             </a:r>
           </a:p>
           <a:p>
             <a:pPr lvl="3"/>
             <a:r>
-              <a:rPr lang="en-US" smtClean="0"/>
+              <a:rPr lang="en-US"/>
               <a:t>Fourth level</a:t>
             </a:r>
           </a:p>
           <a:p>
             <a:pPr lvl="4"/>
             <a:r>
-              <a:rPr lang="en-US" smtClean="0"/>
+              <a:rPr lang="en-US"/>
               <a:t>Fifth level</a:t>
             </a:r>
-            <a:endParaRPr lang="en-US"/>
           </a:p>
         </p:txBody>
       </p:sp>
@@ -1245,7 +1252,7 @@
           <a:p>
             <a:fld id="{8FA1617A-90DC-4CC3-A532-0A26A8F3A218}" type="datetimeFigureOut">
               <a:rPr lang="en-US" smtClean="0"/>
-              <a:t>6/29/2016</a:t>
+              <a:t>9/20/2016</a:t>
             </a:fld>
             <a:endParaRPr lang="en-US"/>
           </a:p>
@@ -1348,10 +1355,9 @@
           </a:lstStyle>
           <a:p>
             <a:r>
-              <a:rPr lang="en-US" smtClean="0"/>
+              <a:rPr lang="en-US"/>
               <a:t>Click to edit Master title style</a:t>
             </a:r>
-            <a:endParaRPr lang="en-US"/>
           </a:p>
         </p:txBody>
       </p:sp>
@@ -1468,7 +1474,7 @@
           <a:p>
             <a:pPr lvl="0"/>
             <a:r>
-              <a:rPr lang="en-US" smtClean="0"/>
+              <a:rPr lang="en-US"/>
               <a:t>Click to edit Master text styles</a:t>
             </a:r>
           </a:p>
@@ -1491,7 +1497,7 @@
           <a:p>
             <a:fld id="{8FA1617A-90DC-4CC3-A532-0A26A8F3A218}" type="datetimeFigureOut">
               <a:rPr lang="en-US" smtClean="0"/>
-              <a:t>6/29/2016</a:t>
+              <a:t>9/20/2016</a:t>
             </a:fld>
             <a:endParaRPr lang="en-US"/>
           </a:p>
@@ -1585,10 +1591,9 @@
           <a:lstStyle/>
           <a:p>
             <a:r>
-              <a:rPr lang="en-US" smtClean="0"/>
+              <a:rPr lang="en-US"/>
               <a:t>Click to edit Master title style</a:t>
             </a:r>
-            <a:endParaRPr lang="en-US"/>
           </a:p>
         </p:txBody>
       </p:sp>
@@ -1642,38 +1647,37 @@
           <a:p>
             <a:pPr lvl="0"/>
             <a:r>
-              <a:rPr lang="en-US" smtClean="0"/>
+              <a:rPr lang="en-US"/>
               <a:t>Click to edit Master text styles</a:t>
             </a:r>
           </a:p>
           <a:p>
             <a:pPr lvl="1"/>
             <a:r>
-              <a:rPr lang="en-US" smtClean="0"/>
+              <a:rPr lang="en-US"/>
               <a:t>Second level</a:t>
             </a:r>
           </a:p>
           <a:p>
             <a:pPr lvl="2"/>
             <a:r>
-              <a:rPr lang="en-US" smtClean="0"/>
+              <a:rPr lang="en-US"/>
               <a:t>Third level</a:t>
             </a:r>
           </a:p>
           <a:p>
             <a:pPr lvl="3"/>
             <a:r>
-              <a:rPr lang="en-US" smtClean="0"/>
+              <a:rPr lang="en-US"/>
               <a:t>Fourth level</a:t>
             </a:r>
           </a:p>
           <a:p>
             <a:pPr lvl="4"/>
             <a:r>
-              <a:rPr lang="en-US" smtClean="0"/>
+              <a:rPr lang="en-US"/>
               <a:t>Fifth level</a:t>
             </a:r>
-            <a:endParaRPr lang="en-US"/>
           </a:p>
         </p:txBody>
       </p:sp>
@@ -1727,38 +1731,37 @@
           <a:p>
             <a:pPr lvl="0"/>
             <a:r>
-              <a:rPr lang="en-US" smtClean="0"/>
+              <a:rPr lang="en-US"/>
               <a:t>Click to edit Master text styles</a:t>
             </a:r>
           </a:p>
           <a:p>
             <a:pPr lvl="1"/>
             <a:r>
-              <a:rPr lang="en-US" smtClean="0"/>
+              <a:rPr lang="en-US"/>
               <a:t>Second level</a:t>
             </a:r>
           </a:p>
           <a:p>
             <a:pPr lvl="2"/>
             <a:r>
-              <a:rPr lang="en-US" smtClean="0"/>
+              <a:rPr lang="en-US"/>
               <a:t>Third level</a:t>
             </a:r>
           </a:p>
           <a:p>
             <a:pPr lvl="3"/>
             <a:r>
-              <a:rPr lang="en-US" smtClean="0"/>
+              <a:rPr lang="en-US"/>
               <a:t>Fourth level</a:t>
             </a:r>
           </a:p>
           <a:p>
             <a:pPr lvl="4"/>
             <a:r>
-              <a:rPr lang="en-US" smtClean="0"/>
+              <a:rPr lang="en-US"/>
               <a:t>Fifth level</a:t>
             </a:r>
-            <a:endParaRPr lang="en-US"/>
           </a:p>
         </p:txBody>
       </p:sp>
@@ -1779,7 +1782,7 @@
           <a:p>
             <a:fld id="{8FA1617A-90DC-4CC3-A532-0A26A8F3A218}" type="datetimeFigureOut">
               <a:rPr lang="en-US" smtClean="0"/>
-              <a:t>6/29/2016</a:t>
+              <a:t>9/20/2016</a:t>
             </a:fld>
             <a:endParaRPr lang="en-US"/>
           </a:p>
@@ -1877,10 +1880,9 @@
           </a:lstStyle>
           <a:p>
             <a:r>
-              <a:rPr lang="en-US" smtClean="0"/>
+              <a:rPr lang="en-US"/>
               <a:t>Click to edit Master title style</a:t>
             </a:r>
-            <a:endParaRPr lang="en-US"/>
           </a:p>
         </p:txBody>
       </p:sp>
@@ -1943,7 +1945,7 @@
           <a:p>
             <a:pPr lvl="0"/>
             <a:r>
-              <a:rPr lang="en-US" smtClean="0"/>
+              <a:rPr lang="en-US"/>
               <a:t>Click to edit Master text styles</a:t>
             </a:r>
           </a:p>
@@ -1999,38 +2001,37 @@
           <a:p>
             <a:pPr lvl="0"/>
             <a:r>
-              <a:rPr lang="en-US" smtClean="0"/>
+              <a:rPr lang="en-US"/>
               <a:t>Click to edit Master text styles</a:t>
             </a:r>
           </a:p>
           <a:p>
             <a:pPr lvl="1"/>
             <a:r>
-              <a:rPr lang="en-US" smtClean="0"/>
+              <a:rPr lang="en-US"/>
               <a:t>Second level</a:t>
             </a:r>
           </a:p>
           <a:p>
             <a:pPr lvl="2"/>
             <a:r>
-              <a:rPr lang="en-US" smtClean="0"/>
+              <a:rPr lang="en-US"/>
               <a:t>Third level</a:t>
             </a:r>
           </a:p>
           <a:p>
             <a:pPr lvl="3"/>
             <a:r>
-              <a:rPr lang="en-US" smtClean="0"/>
+              <a:rPr lang="en-US"/>
               <a:t>Fourth level</a:t>
             </a:r>
           </a:p>
           <a:p>
             <a:pPr lvl="4"/>
             <a:r>
-              <a:rPr lang="en-US" smtClean="0"/>
+              <a:rPr lang="en-US"/>
               <a:t>Fifth level</a:t>
             </a:r>
-            <a:endParaRPr lang="en-US"/>
           </a:p>
         </p:txBody>
       </p:sp>
@@ -2093,7 +2094,7 @@
           <a:p>
             <a:pPr lvl="0"/>
             <a:r>
-              <a:rPr lang="en-US" smtClean="0"/>
+              <a:rPr lang="en-US"/>
               <a:t>Click to edit Master text styles</a:t>
             </a:r>
           </a:p>
@@ -2149,38 +2150,37 @@
           <a:p>
             <a:pPr lvl="0"/>
             <a:r>
-              <a:rPr lang="en-US" smtClean="0"/>
+              <a:rPr lang="en-US"/>
               <a:t>Click to edit Master text styles</a:t>
             </a:r>
           </a:p>
           <a:p>
             <a:pPr lvl="1"/>
             <a:r>
-              <a:rPr lang="en-US" smtClean="0"/>
+              <a:rPr lang="en-US"/>
               <a:t>Second level</a:t>
             </a:r>
           </a:p>
           <a:p>
             <a:pPr lvl="2"/>
             <a:r>
-              <a:rPr lang="en-US" smtClean="0"/>
+              <a:rPr lang="en-US"/>
               <a:t>Third level</a:t>
             </a:r>
           </a:p>
           <a:p>
             <a:pPr lvl="3"/>
             <a:r>
-              <a:rPr lang="en-US" smtClean="0"/>
+              <a:rPr lang="en-US"/>
               <a:t>Fourth level</a:t>
             </a:r>
           </a:p>
           <a:p>
             <a:pPr lvl="4"/>
             <a:r>
-              <a:rPr lang="en-US" smtClean="0"/>
+              <a:rPr lang="en-US"/>
               <a:t>Fifth level</a:t>
             </a:r>
-            <a:endParaRPr lang="en-US"/>
           </a:p>
         </p:txBody>
       </p:sp>
@@ -2201,7 +2201,7 @@
           <a:p>
             <a:fld id="{8FA1617A-90DC-4CC3-A532-0A26A8F3A218}" type="datetimeFigureOut">
               <a:rPr lang="en-US" smtClean="0"/>
-              <a:t>6/29/2016</a:t>
+              <a:t>9/20/2016</a:t>
             </a:fld>
             <a:endParaRPr lang="en-US"/>
           </a:p>
@@ -2295,10 +2295,9 @@
           <a:lstStyle/>
           <a:p>
             <a:r>
-              <a:rPr lang="en-US" smtClean="0"/>
+              <a:rPr lang="en-US"/>
               <a:t>Click to edit Master title style</a:t>
             </a:r>
-            <a:endParaRPr lang="en-US"/>
           </a:p>
         </p:txBody>
       </p:sp>
@@ -2319,7 +2318,7 @@
           <a:p>
             <a:fld id="{8FA1617A-90DC-4CC3-A532-0A26A8F3A218}" type="datetimeFigureOut">
               <a:rPr lang="en-US" smtClean="0"/>
-              <a:t>6/29/2016</a:t>
+              <a:t>9/20/2016</a:t>
             </a:fld>
             <a:endParaRPr lang="en-US"/>
           </a:p>
@@ -2414,7 +2413,7 @@
           <a:p>
             <a:fld id="{8FA1617A-90DC-4CC3-A532-0A26A8F3A218}" type="datetimeFigureOut">
               <a:rPr lang="en-US" smtClean="0"/>
-              <a:t>6/29/2016</a:t>
+              <a:t>9/20/2016</a:t>
             </a:fld>
             <a:endParaRPr lang="en-US"/>
           </a:p>
@@ -2517,10 +2516,9 @@
           </a:lstStyle>
           <a:p>
             <a:r>
-              <a:rPr lang="en-US" smtClean="0"/>
+              <a:rPr lang="en-US"/>
               <a:t>Click to edit Master title style</a:t>
             </a:r>
-            <a:endParaRPr lang="en-US"/>
           </a:p>
         </p:txBody>
       </p:sp>
@@ -2574,38 +2572,37 @@
           <a:p>
             <a:pPr lvl="0"/>
             <a:r>
-              <a:rPr lang="en-US" smtClean="0"/>
+              <a:rPr lang="en-US"/>
               <a:t>Click to edit Master text styles</a:t>
             </a:r>
           </a:p>
           <a:p>
             <a:pPr lvl="1"/>
             <a:r>
-              <a:rPr lang="en-US" smtClean="0"/>
+              <a:rPr lang="en-US"/>
               <a:t>Second level</a:t>
             </a:r>
           </a:p>
           <a:p>
             <a:pPr lvl="2"/>
             <a:r>
-              <a:rPr lang="en-US" smtClean="0"/>
+              <a:rPr lang="en-US"/>
               <a:t>Third level</a:t>
             </a:r>
           </a:p>
           <a:p>
             <a:pPr lvl="3"/>
             <a:r>
-              <a:rPr lang="en-US" smtClean="0"/>
+              <a:rPr lang="en-US"/>
               <a:t>Fourth level</a:t>
             </a:r>
           </a:p>
           <a:p>
             <a:pPr lvl="4"/>
             <a:r>
-              <a:rPr lang="en-US" smtClean="0"/>
+              <a:rPr lang="en-US"/>
               <a:t>Fifth level</a:t>
             </a:r>
-            <a:endParaRPr lang="en-US"/>
           </a:p>
         </p:txBody>
       </p:sp>
@@ -2668,7 +2665,7 @@
           <a:p>
             <a:pPr lvl="0"/>
             <a:r>
-              <a:rPr lang="en-US" smtClean="0"/>
+              <a:rPr lang="en-US"/>
               <a:t>Click to edit Master text styles</a:t>
             </a:r>
           </a:p>
@@ -2691,7 +2688,7 @@
           <a:p>
             <a:fld id="{8FA1617A-90DC-4CC3-A532-0A26A8F3A218}" type="datetimeFigureOut">
               <a:rPr lang="en-US" smtClean="0"/>
-              <a:t>6/29/2016</a:t>
+              <a:t>9/20/2016</a:t>
             </a:fld>
             <a:endParaRPr lang="en-US"/>
           </a:p>
@@ -2794,10 +2791,9 @@
           </a:lstStyle>
           <a:p>
             <a:r>
-              <a:rPr lang="en-US" smtClean="0"/>
+              <a:rPr lang="en-US"/>
               <a:t>Click to edit Master title style</a:t>
             </a:r>
-            <a:endParaRPr lang="en-US"/>
           </a:p>
         </p:txBody>
       </p:sp>
@@ -2921,7 +2917,7 @@
           <a:p>
             <a:pPr lvl="0"/>
             <a:r>
-              <a:rPr lang="en-US" smtClean="0"/>
+              <a:rPr lang="en-US"/>
               <a:t>Click to edit Master text styles</a:t>
             </a:r>
           </a:p>
@@ -2944,7 +2940,7 @@
           <a:p>
             <a:fld id="{8FA1617A-90DC-4CC3-A532-0A26A8F3A218}" type="datetimeFigureOut">
               <a:rPr lang="en-US" smtClean="0"/>
-              <a:t>6/29/2016</a:t>
+              <a:t>9/20/2016</a:t>
             </a:fld>
             <a:endParaRPr lang="en-US"/>
           </a:p>
@@ -3053,10 +3049,9 @@
           <a:lstStyle/>
           <a:p>
             <a:r>
-              <a:rPr lang="en-US" smtClean="0"/>
+              <a:rPr lang="en-US"/>
               <a:t>Click to edit Master title style</a:t>
             </a:r>
-            <a:endParaRPr lang="en-US"/>
           </a:p>
         </p:txBody>
       </p:sp>
@@ -3087,38 +3082,37 @@
           <a:p>
             <a:pPr lvl="0"/>
             <a:r>
-              <a:rPr lang="en-US" smtClean="0"/>
+              <a:rPr lang="en-US"/>
               <a:t>Click to edit Master text styles</a:t>
             </a:r>
           </a:p>
           <a:p>
             <a:pPr lvl="1"/>
             <a:r>
-              <a:rPr lang="en-US" smtClean="0"/>
+              <a:rPr lang="en-US"/>
               <a:t>Second level</a:t>
             </a:r>
           </a:p>
           <a:p>
             <a:pPr lvl="2"/>
             <a:r>
-              <a:rPr lang="en-US" smtClean="0"/>
+              <a:rPr lang="en-US"/>
               <a:t>Third level</a:t>
             </a:r>
           </a:p>
           <a:p>
             <a:pPr lvl="3"/>
             <a:r>
-              <a:rPr lang="en-US" smtClean="0"/>
+              <a:rPr lang="en-US"/>
               <a:t>Fourth level</a:t>
             </a:r>
           </a:p>
           <a:p>
             <a:pPr lvl="4"/>
             <a:r>
-              <a:rPr lang="en-US" smtClean="0"/>
+              <a:rPr lang="en-US"/>
               <a:t>Fifth level</a:t>
             </a:r>
-            <a:endParaRPr lang="en-US"/>
           </a:p>
         </p:txBody>
       </p:sp>
@@ -3157,7 +3151,7 @@
           <a:p>
             <a:fld id="{8FA1617A-90DC-4CC3-A532-0A26A8F3A218}" type="datetimeFigureOut">
               <a:rPr lang="en-US" smtClean="0"/>
-              <a:t>6/29/2016</a:t>
+              <a:t>9/20/2016</a:t>
             </a:fld>
             <a:endParaRPr lang="en-US"/>
           </a:p>
@@ -3593,18 +3587,13 @@
           <a:lstStyle/>
           <a:p>
             <a:r>
-              <a:rPr lang="en-US" b="1" dirty="0" smtClean="0">
+              <a:rPr lang="en-US" b="1" dirty="0">
                 <a:solidFill>
                   <a:schemeClr val="bg1"/>
                 </a:solidFill>
               </a:rPr>
               <a:t>ABR 16</a:t>
             </a:r>
-            <a:endParaRPr lang="en-US" b="1" dirty="0">
-              <a:solidFill>
-                <a:schemeClr val="bg1"/>
-              </a:solidFill>
-            </a:endParaRPr>
           </a:p>
         </p:txBody>
       </p:sp>
@@ -3642,10 +3631,9 @@
           </a:lstStyle>
           <a:p>
             <a:r>
-              <a:rPr lang="en-US" dirty="0" smtClean="0"/>
+              <a:rPr lang="en-US" dirty="0"/>
               <a:t>MAY 16</a:t>
             </a:r>
-            <a:endParaRPr lang="en-US" dirty="0"/>
           </a:p>
         </p:txBody>
       </p:sp>
@@ -3683,10 +3671,9 @@
           </a:lstStyle>
           <a:p>
             <a:r>
-              <a:rPr lang="en-US" dirty="0" smtClean="0"/>
+              <a:rPr lang="en-US" dirty="0"/>
               <a:t>JUN 16</a:t>
             </a:r>
-            <a:endParaRPr lang="en-US" dirty="0"/>
           </a:p>
         </p:txBody>
       </p:sp>
@@ -3724,10 +3711,9 @@
           </a:lstStyle>
           <a:p>
             <a:r>
-              <a:rPr lang="en-US" dirty="0" smtClean="0"/>
+              <a:rPr lang="en-US" dirty="0"/>
               <a:t>JUL 16</a:t>
             </a:r>
-            <a:endParaRPr lang="en-US" dirty="0"/>
           </a:p>
         </p:txBody>
       </p:sp>
@@ -3765,10 +3751,9 @@
           </a:lstStyle>
           <a:p>
             <a:r>
-              <a:rPr lang="en-US" dirty="0" smtClean="0"/>
+              <a:rPr lang="en-US" dirty="0"/>
               <a:t>AGO 16</a:t>
             </a:r>
-            <a:endParaRPr lang="en-US" dirty="0"/>
           </a:p>
         </p:txBody>
       </p:sp>
@@ -3806,10 +3791,9 @@
           </a:lstStyle>
           <a:p>
             <a:r>
-              <a:rPr lang="en-US" dirty="0" smtClean="0"/>
+              <a:rPr lang="en-US" dirty="0"/>
               <a:t>SEP 16</a:t>
             </a:r>
-            <a:endParaRPr lang="en-US" dirty="0"/>
           </a:p>
         </p:txBody>
       </p:sp>
@@ -3847,10 +3831,9 @@
           </a:lstStyle>
           <a:p>
             <a:r>
-              <a:rPr lang="en-US" dirty="0" smtClean="0"/>
+              <a:rPr lang="en-US" dirty="0"/>
               <a:t>OCT 16</a:t>
             </a:r>
-            <a:endParaRPr lang="en-US" dirty="0"/>
           </a:p>
         </p:txBody>
       </p:sp>
@@ -3888,10 +3871,9 @@
           </a:lstStyle>
           <a:p>
             <a:r>
-              <a:rPr lang="en-US" dirty="0" smtClean="0"/>
+              <a:rPr lang="en-US" dirty="0"/>
               <a:t>NOV 16</a:t>
             </a:r>
-            <a:endParaRPr lang="en-US" dirty="0"/>
           </a:p>
         </p:txBody>
       </p:sp>
@@ -4163,27 +4145,27 @@
           <a:p>
             <a:pPr algn="ctr"/>
             <a:r>
-              <a:rPr lang="en-US" b="1" dirty="0" smtClean="0"/>
+              <a:rPr lang="en-US" b="1" dirty="0"/>
               <a:t>Sistema </a:t>
             </a:r>
             <a:r>
-              <a:rPr lang="en-US" b="1" dirty="0" err="1" smtClean="0"/>
+              <a:rPr lang="en-US" b="1" dirty="0" err="1"/>
               <a:t>Adaptativo</a:t>
             </a:r>
             <a:r>
-              <a:rPr lang="en-US" b="1" dirty="0" smtClean="0"/>
+              <a:rPr lang="en-US" b="1" dirty="0"/>
               <a:t> de </a:t>
             </a:r>
             <a:r>
-              <a:rPr lang="en-US" b="1" dirty="0" err="1" smtClean="0"/>
+              <a:rPr lang="en-US" b="1" dirty="0" err="1"/>
               <a:t>Formación</a:t>
             </a:r>
             <a:r>
-              <a:rPr lang="en-US" b="1" dirty="0" smtClean="0"/>
+              <a:rPr lang="en-US" b="1" dirty="0"/>
               <a:t> </a:t>
             </a:r>
             <a:r>
-              <a:rPr lang="en-US" b="1" dirty="0" err="1" smtClean="0"/>
+              <a:rPr lang="en-US" b="1" dirty="0" err="1"/>
               <a:t>Educativa</a:t>
             </a:r>
             <a:endParaRPr lang="en-US" b="1" dirty="0"/>
@@ -4227,11 +4209,11 @@
           <a:p>
             <a:pPr algn="ctr"/>
             <a:r>
-              <a:rPr lang="en-US" b="1" dirty="0" smtClean="0"/>
+              <a:rPr lang="en-US" b="1" dirty="0"/>
               <a:t>1. </a:t>
             </a:r>
             <a:r>
-              <a:rPr lang="en-US" b="1" dirty="0" err="1" smtClean="0"/>
+              <a:rPr lang="en-US" b="1" dirty="0" err="1"/>
               <a:t>Inicio</a:t>
             </a:r>
             <a:endParaRPr lang="en-US" b="1" dirty="0"/>
@@ -4275,10 +4257,9 @@
           <a:p>
             <a:pPr algn="ctr"/>
             <a:r>
-              <a:rPr lang="en-US" b="1" dirty="0" smtClean="0"/>
+              <a:rPr lang="en-US" b="1" dirty="0"/>
               <a:t>2. R &amp; D</a:t>
             </a:r>
-            <a:endParaRPr lang="en-US" b="1" dirty="0"/>
           </a:p>
         </p:txBody>
       </p:sp>
@@ -4319,26 +4300,25 @@
           <a:p>
             <a:pPr algn="ctr"/>
             <a:r>
-              <a:rPr lang="en-US" b="1" dirty="0" smtClean="0"/>
+              <a:rPr lang="en-US" b="1" dirty="0"/>
               <a:t>3. </a:t>
             </a:r>
             <a:r>
-              <a:rPr lang="en-US" b="1" dirty="0" err="1" smtClean="0"/>
+              <a:rPr lang="en-US" b="1" dirty="0" err="1"/>
               <a:t>Analisis</a:t>
             </a:r>
             <a:r>
-              <a:rPr lang="en-US" b="1" dirty="0" smtClean="0"/>
+              <a:rPr lang="en-US" b="1" dirty="0"/>
               <a:t>, </a:t>
             </a:r>
             <a:r>
-              <a:rPr lang="en-US" b="1" dirty="0" err="1" smtClean="0"/>
+              <a:rPr lang="en-US" b="1" dirty="0" err="1"/>
               <a:t>Desarrollo</a:t>
             </a:r>
             <a:r>
-              <a:rPr lang="en-US" b="1" dirty="0" smtClean="0"/>
+              <a:rPr lang="en-US" b="1" dirty="0"/>
               <a:t> y Testing</a:t>
             </a:r>
-            <a:endParaRPr lang="en-US" b="1" dirty="0"/>
           </a:p>
         </p:txBody>
       </p:sp>
@@ -4419,11 +4399,11 @@
           <a:p>
             <a:pPr algn="ctr"/>
             <a:r>
-              <a:rPr lang="en-US" sz="1600" b="1" dirty="0" smtClean="0"/>
+              <a:rPr lang="en-US" sz="1600" b="1" dirty="0"/>
               <a:t>5. </a:t>
             </a:r>
             <a:r>
-              <a:rPr lang="en-US" sz="1600" b="1" dirty="0" err="1" smtClean="0"/>
+              <a:rPr lang="en-US" sz="1600" b="1" dirty="0" err="1"/>
               <a:t>Cierre</a:t>
             </a:r>
             <a:endParaRPr lang="en-US" sz="1600" b="1" dirty="0"/>
@@ -4465,14 +4445,13 @@
           <a:p>
             <a:pPr algn="ctr"/>
             <a:r>
-              <a:rPr lang="en-US" b="1" dirty="0" err="1" smtClean="0"/>
+              <a:rPr lang="en-US" b="1" dirty="0" err="1"/>
               <a:t>Incremento</a:t>
             </a:r>
             <a:r>
-              <a:rPr lang="en-US" b="1" dirty="0" smtClean="0"/>
+              <a:rPr lang="en-US" b="1" dirty="0"/>
               <a:t> 1</a:t>
             </a:r>
-            <a:endParaRPr lang="en-US" b="1" dirty="0"/>
           </a:p>
         </p:txBody>
       </p:sp>
@@ -4604,15 +4583,15 @@
           <a:p>
             <a:pPr algn="ctr"/>
             <a:r>
-              <a:rPr lang="en-US" sz="1400" b="1" dirty="0" err="1" smtClean="0"/>
+              <a:rPr lang="en-US" sz="1400" b="1" dirty="0" err="1"/>
               <a:t>Presentacion</a:t>
             </a:r>
             <a:r>
-              <a:rPr lang="en-US" sz="1400" b="1" dirty="0" smtClean="0"/>
+              <a:rPr lang="en-US" sz="1400" b="1" dirty="0"/>
               <a:t> </a:t>
             </a:r>
             <a:r>
-              <a:rPr lang="en-US" sz="1400" b="1" dirty="0" err="1" smtClean="0"/>
+              <a:rPr lang="en-US" sz="1400" b="1" dirty="0" err="1"/>
               <a:t>Comercial</a:t>
             </a:r>
             <a:endParaRPr lang="en-US" sz="1400" b="1" dirty="0"/>
@@ -4765,11 +4744,11 @@
           <a:lstStyle/>
           <a:p>
             <a:r>
-              <a:rPr lang="en-US" sz="1400" b="1" dirty="0" smtClean="0"/>
+              <a:rPr lang="en-US" sz="1400" b="1" dirty="0"/>
               <a:t>4. </a:t>
             </a:r>
             <a:r>
-              <a:rPr lang="en-US" sz="1400" b="1" dirty="0" err="1" smtClean="0"/>
+              <a:rPr lang="en-US" sz="1400" b="1" dirty="0" err="1"/>
               <a:t>Implementación</a:t>
             </a:r>
             <a:endParaRPr lang="en-US" sz="1400" b="1" dirty="0"/>
@@ -4799,10 +4778,9 @@
           <a:lstStyle/>
           <a:p>
             <a:r>
-              <a:rPr lang="en-US" sz="1600" b="1" dirty="0" smtClean="0"/>
+              <a:rPr lang="en-US" sz="1600" b="1" dirty="0"/>
               <a:t>18/11</a:t>
             </a:r>
-            <a:endParaRPr lang="en-US" sz="1600" b="1" dirty="0"/>
           </a:p>
         </p:txBody>
       </p:sp>
@@ -4814,7 +4792,7 @@
         </p:nvCxnSpPr>
         <p:spPr>
           <a:xfrm>
-            <a:off x="4536604" y="2590056"/>
+            <a:off x="8569052" y="2590056"/>
             <a:ext cx="0" cy="5182344"/>
           </a:xfrm>
           <a:prstGeom prst="line">
@@ -4906,27 +4884,27 @@
           <a:p>
             <a:pPr algn="ctr"/>
             <a:r>
-              <a:rPr lang="en-US" sz="1100" dirty="0" smtClean="0"/>
+              <a:rPr lang="en-US" sz="1100" dirty="0"/>
               <a:t>01/07 – Fin de  </a:t>
             </a:r>
             <a:r>
-              <a:rPr lang="en-US" sz="1100" dirty="0" err="1" smtClean="0"/>
+              <a:rPr lang="en-US" sz="1100" dirty="0" err="1"/>
               <a:t>etapa</a:t>
             </a:r>
             <a:r>
-              <a:rPr lang="en-US" sz="1100" dirty="0" smtClean="0"/>
+              <a:rPr lang="en-US" sz="1100" dirty="0"/>
               <a:t> de </a:t>
             </a:r>
             <a:r>
-              <a:rPr lang="en-US" sz="1100" dirty="0" err="1" smtClean="0"/>
+              <a:rPr lang="en-US" sz="1100" dirty="0" err="1"/>
               <a:t>Inicio</a:t>
             </a:r>
             <a:r>
-              <a:rPr lang="en-US" sz="1100" dirty="0" smtClean="0"/>
+              <a:rPr lang="en-US" sz="1100" dirty="0"/>
               <a:t> y </a:t>
             </a:r>
             <a:r>
-              <a:rPr lang="en-US" sz="1100" dirty="0" err="1" smtClean="0"/>
+              <a:rPr lang="en-US" sz="1100" dirty="0" err="1"/>
               <a:t>Relevamiento</a:t>
             </a:r>
             <a:endParaRPr lang="en-US" sz="1100" dirty="0"/>
@@ -4997,18 +4975,17 @@
           <a:p>
             <a:pPr algn="ctr"/>
             <a:r>
-              <a:rPr lang="en-US" sz="1100" dirty="0" smtClean="0"/>
+              <a:rPr lang="en-US" sz="1100" dirty="0"/>
               <a:t>30/08 – Fin de  </a:t>
             </a:r>
             <a:r>
-              <a:rPr lang="en-US" sz="1100" dirty="0" err="1" smtClean="0"/>
+              <a:rPr lang="en-US" sz="1100" dirty="0" err="1"/>
               <a:t>Incremento</a:t>
             </a:r>
             <a:r>
-              <a:rPr lang="en-US" sz="1100" dirty="0" smtClean="0"/>
+              <a:rPr lang="en-US" sz="1100" dirty="0"/>
               <a:t> 1</a:t>
             </a:r>
-            <a:endParaRPr lang="en-US" sz="1100" dirty="0"/>
           </a:p>
         </p:txBody>
       </p:sp>
@@ -5111,25 +5088,24 @@
           <a:p>
             <a:pPr algn="ctr"/>
             <a:r>
-              <a:rPr lang="en-US" sz="1100" dirty="0" smtClean="0"/>
+              <a:rPr lang="en-US" sz="1100" dirty="0"/>
               <a:t>8/11 </a:t>
             </a:r>
           </a:p>
           <a:p>
             <a:pPr algn="ctr"/>
             <a:r>
-              <a:rPr lang="en-US" sz="1100" dirty="0" smtClean="0"/>
+              <a:rPr lang="en-US" sz="1100" dirty="0"/>
               <a:t>Fin de  </a:t>
             </a:r>
             <a:r>
-              <a:rPr lang="en-US" sz="1100" dirty="0" err="1" smtClean="0"/>
+              <a:rPr lang="en-US" sz="1100" dirty="0" err="1"/>
               <a:t>Incremento</a:t>
             </a:r>
             <a:r>
-              <a:rPr lang="en-US" sz="1100" dirty="0" smtClean="0"/>
+              <a:rPr lang="en-US" sz="1100" dirty="0"/>
               <a:t> 2</a:t>
             </a:r>
-            <a:endParaRPr lang="en-US" sz="1100" dirty="0"/>
           </a:p>
         </p:txBody>
       </p:sp>

</xml_diff>